<commit_message>
fixed discrepancies in the diagram: - missing parathesis - updated dependencies
</commit_message>
<xml_diff>
--- a/docs/app-content.pptx
+++ b/docs/app-content.pptx
@@ -250,7 +250,7 @@
           <a:p>
             <a:fld id="{C1F639CD-02BA-E14F-BB05-54A9501A84F3}" type="datetimeFigureOut">
               <a:rPr lang="en-US" smtClean="0"/>
-              <a:t>4/13/16</a:t>
+              <a:t>9/26/16</a:t>
             </a:fld>
             <a:endParaRPr lang="en-US"/>
           </a:p>
@@ -415,7 +415,7 @@
           <a:p>
             <a:fld id="{7B47E9F9-6557-4923-BE10-1C342566E3EE}" type="datetimeFigureOut">
               <a:rPr lang="en-US" smtClean="0"/>
-              <a:t>4/13/16</a:t>
+              <a:t>9/26/16</a:t>
             </a:fld>
             <a:endParaRPr lang="en-US"/>
           </a:p>
@@ -11911,7 +11911,7 @@
             <a:pPr algn="ctr"/>
             <a:r>
               <a:rPr lang="en-US" sz="1200" dirty="0" smtClean="0"/>
-              <a:t>Spring </a:t>
+              <a:t>(Spring </a:t>
             </a:r>
             <a:r>
               <a:rPr lang="en-US" sz="1200" dirty="0"/>
@@ -11919,7 +11919,23 @@
             </a:r>
             <a:r>
               <a:rPr lang="en-US" sz="1200" dirty="0" smtClean="0"/>
-              <a:t>oot, Spring Data JPA, Spring Cloud Connectors</a:t>
+              <a:t>oot, </a:t>
+            </a:r>
+            <a:r>
+              <a:rPr lang="en-US" sz="1200" dirty="0" smtClean="0"/>
+              <a:t>Spring Data </a:t>
+            </a:r>
+            <a:r>
+              <a:rPr lang="en-US" sz="1200" smtClean="0"/>
+              <a:t>REST, Spring </a:t>
+            </a:r>
+            <a:r>
+              <a:rPr lang="en-US" sz="1200" dirty="0" smtClean="0"/>
+              <a:t>Data </a:t>
+            </a:r>
+            <a:r>
+              <a:rPr lang="en-US" sz="1200" dirty="0" smtClean="0"/>
+              <a:t>JPA)</a:t>
             </a:r>
             <a:endParaRPr lang="en-US" sz="1200" dirty="0"/>
           </a:p>

</xml_diff>